<commit_message>
Adding reference to github in Powerpoint that is also copied to FTP site
</commit_message>
<xml_diff>
--- a/documents/sup246_01_DICOMwebModalityServices.20241104.pptx
+++ b/documents/sup246_01_DICOMwebModalityServices.20241104.pptx
@@ -5,7 +5,7 @@
     <p:sldMasterId id="2147483672" r:id="rId1"/>
   </p:sldMasterIdLst>
   <p:notesMasterIdLst>
-    <p:notesMasterId r:id="rId17"/>
+    <p:notesMasterId r:id="rId18"/>
   </p:notesMasterIdLst>
   <p:sldIdLst>
     <p:sldId id="256" r:id="rId2"/>
@@ -18,11 +18,12 @@
     <p:sldId id="455" r:id="rId9"/>
     <p:sldId id="445" r:id="rId10"/>
     <p:sldId id="450" r:id="rId11"/>
-    <p:sldId id="446" r:id="rId12"/>
-    <p:sldId id="447" r:id="rId13"/>
-    <p:sldId id="441" r:id="rId14"/>
-    <p:sldId id="449" r:id="rId15"/>
-    <p:sldId id="448" r:id="rId16"/>
+    <p:sldId id="456" r:id="rId12"/>
+    <p:sldId id="446" r:id="rId13"/>
+    <p:sldId id="447" r:id="rId14"/>
+    <p:sldId id="441" r:id="rId15"/>
+    <p:sldId id="449" r:id="rId16"/>
+    <p:sldId id="448" r:id="rId17"/>
   </p:sldIdLst>
   <p:sldSz cx="12192000" cy="6858000"/>
   <p:notesSz cx="7023100" cy="9309100"/>
@@ -5081,7 +5082,15 @@
           <a:p>
             <a:r>
               <a:rPr lang="en-US" dirty="0"/>
-              <a:t>What HTTP Method is to be Used for Updates?</a:t>
+              <a:t>What HTTP Method is to be Used for Updates </a:t>
+            </a:r>
+            <a:r>
+              <a:rPr lang="en-US" dirty="0" err="1"/>
+              <a:t>etc</a:t>
+            </a:r>
+            <a:r>
+              <a:rPr lang="en-US" dirty="0"/>
+              <a:t>?</a:t>
             </a:r>
           </a:p>
         </p:txBody>
@@ -5377,6 +5386,192 @@
 </file>
 
 <file path=ppt/slides/slide11.xml><?xml version="1.0" encoding="utf-8"?>
+<p:sld xmlns:a="http://schemas.openxmlformats.org/drawingml/2006/main" xmlns:r="http://schemas.openxmlformats.org/officeDocument/2006/relationships" xmlns:p="http://schemas.openxmlformats.org/presentationml/2006/main">
+  <p:cSld>
+    <p:spTree>
+      <p:nvGrpSpPr>
+        <p:cNvPr id="1" name=""/>
+        <p:cNvGrpSpPr/>
+        <p:nvPr/>
+      </p:nvGrpSpPr>
+      <p:grpSpPr>
+        <a:xfrm>
+          <a:off x="0" y="0"/>
+          <a:ext cx="0" cy="0"/>
+          <a:chOff x="0" y="0"/>
+          <a:chExt cx="0" cy="0"/>
+        </a:xfrm>
+      </p:grpSpPr>
+      <p:sp>
+        <p:nvSpPr>
+          <p:cNvPr id="2" name="Title 1">
+            <a:extLst>
+              <a:ext uri="{FF2B5EF4-FFF2-40B4-BE49-F238E27FC236}">
+                <a16:creationId xmlns:a16="http://schemas.microsoft.com/office/drawing/2014/main" id="{7AE3DCF4-7B68-6F81-E4F7-F511D27AD698}"/>
+              </a:ext>
+            </a:extLst>
+          </p:cNvPr>
+          <p:cNvSpPr>
+            <a:spLocks noGrp="1"/>
+          </p:cNvSpPr>
+          <p:nvPr>
+            <p:ph type="title"/>
+          </p:nvPr>
+        </p:nvSpPr>
+        <p:spPr/>
+        <p:txBody>
+          <a:bodyPr/>
+          <a:lstStyle/>
+          <a:p>
+            <a:r>
+              <a:rPr lang="en-US" dirty="0"/>
+              <a:t>References</a:t>
+            </a:r>
+          </a:p>
+        </p:txBody>
+      </p:sp>
+      <p:sp>
+        <p:nvSpPr>
+          <p:cNvPr id="3" name="Content Placeholder 2">
+            <a:extLst>
+              <a:ext uri="{FF2B5EF4-FFF2-40B4-BE49-F238E27FC236}">
+                <a16:creationId xmlns:a16="http://schemas.microsoft.com/office/drawing/2014/main" id="{A5AE4AC8-BD7F-6B1D-BFF6-5AADCD98CA0D}"/>
+              </a:ext>
+            </a:extLst>
+          </p:cNvPr>
+          <p:cNvSpPr>
+            <a:spLocks noGrp="1"/>
+          </p:cNvSpPr>
+          <p:nvPr>
+            <p:ph idx="1"/>
+          </p:nvPr>
+        </p:nvSpPr>
+        <p:spPr/>
+        <p:txBody>
+          <a:bodyPr/>
+          <a:lstStyle/>
+          <a:p>
+            <a:pPr marL="0" indent="0">
+              <a:buNone/>
+            </a:pPr>
+            <a:r>
+              <a:rPr lang="en-US" dirty="0"/>
+              <a:t>This presentation, the examples and the analysis images (and much more) can be found at</a:t>
+            </a:r>
+          </a:p>
+          <a:p>
+            <a:r>
+              <a:rPr lang="en-US" dirty="0"/>
+              <a:t>https://github.com/krotz-dieter/dicomweb-dmwl-mpps</a:t>
+            </a:r>
+          </a:p>
+        </p:txBody>
+      </p:sp>
+      <p:sp>
+        <p:nvSpPr>
+          <p:cNvPr id="4" name="Date Placeholder 3">
+            <a:extLst>
+              <a:ext uri="{FF2B5EF4-FFF2-40B4-BE49-F238E27FC236}">
+                <a16:creationId xmlns:a16="http://schemas.microsoft.com/office/drawing/2014/main" id="{CC88D72F-6B69-0EE0-11FF-C674A7ED7D0F}"/>
+              </a:ext>
+            </a:extLst>
+          </p:cNvPr>
+          <p:cNvSpPr>
+            <a:spLocks noGrp="1"/>
+          </p:cNvSpPr>
+          <p:nvPr>
+            <p:ph type="dt" sz="half" idx="2"/>
+          </p:nvPr>
+        </p:nvSpPr>
+        <p:spPr/>
+        <p:txBody>
+          <a:bodyPr/>
+          <a:lstStyle/>
+          <a:p>
+            <a:r>
+              <a:rPr lang="en-US" noProof="0"/>
+              <a:t>May 2024</a:t>
+            </a:r>
+            <a:endParaRPr lang="en-US" noProof="0" dirty="0"/>
+          </a:p>
+        </p:txBody>
+      </p:sp>
+      <p:sp>
+        <p:nvSpPr>
+          <p:cNvPr id="5" name="Footer Placeholder 4">
+            <a:extLst>
+              <a:ext uri="{FF2B5EF4-FFF2-40B4-BE49-F238E27FC236}">
+                <a16:creationId xmlns:a16="http://schemas.microsoft.com/office/drawing/2014/main" id="{41774195-886B-21FC-5C86-AF7CC7D5E2BC}"/>
+              </a:ext>
+            </a:extLst>
+          </p:cNvPr>
+          <p:cNvSpPr>
+            <a:spLocks noGrp="1"/>
+          </p:cNvSpPr>
+          <p:nvPr>
+            <p:ph type="ftr" sz="quarter" idx="3"/>
+          </p:nvPr>
+        </p:nvSpPr>
+        <p:spPr/>
+        <p:txBody>
+          <a:bodyPr/>
+          <a:lstStyle/>
+          <a:p>
+            <a:r>
+              <a:rPr lang="en-US">
+                <a:latin typeface="Arial" panose="020B0604020202020204" pitchFamily="34" charset="0"/>
+                <a:cs typeface="Arial" panose="020B0604020202020204" pitchFamily="34" charset="0"/>
+              </a:rPr>
+              <a:t>Copyright DICOM® 2024</a:t>
+            </a:r>
+            <a:endParaRPr lang="en-US" dirty="0"/>
+          </a:p>
+        </p:txBody>
+      </p:sp>
+      <p:sp>
+        <p:nvSpPr>
+          <p:cNvPr id="6" name="Slide Number Placeholder 5">
+            <a:extLst>
+              <a:ext uri="{FF2B5EF4-FFF2-40B4-BE49-F238E27FC236}">
+                <a16:creationId xmlns:a16="http://schemas.microsoft.com/office/drawing/2014/main" id="{6FBD552C-A955-9B26-676C-007DD5694D5B}"/>
+              </a:ext>
+            </a:extLst>
+          </p:cNvPr>
+          <p:cNvSpPr>
+            <a:spLocks noGrp="1"/>
+          </p:cNvSpPr>
+          <p:nvPr>
+            <p:ph type="sldNum" sz="quarter" idx="4"/>
+          </p:nvPr>
+        </p:nvSpPr>
+        <p:spPr/>
+        <p:txBody>
+          <a:bodyPr/>
+          <a:lstStyle/>
+          <a:p>
+            <a:fld id="{D57F1E4F-1CFF-5643-939E-217C01CDF565}" type="slidenum">
+              <a:rPr lang="en-US" smtClean="0"/>
+              <a:pPr/>
+              <a:t>11</a:t>
+            </a:fld>
+            <a:endParaRPr lang="en-US" dirty="0"/>
+          </a:p>
+        </p:txBody>
+      </p:sp>
+    </p:spTree>
+    <p:extLst>
+      <p:ext uri="{BB962C8B-B14F-4D97-AF65-F5344CB8AC3E}">
+        <p14:creationId xmlns:p14="http://schemas.microsoft.com/office/powerpoint/2010/main" val="1209483798"/>
+      </p:ext>
+    </p:extLst>
+  </p:cSld>
+  <p:clrMapOvr>
+    <a:masterClrMapping/>
+  </p:clrMapOvr>
+</p:sld>
+</file>
+
+<file path=ppt/slides/slide12.xml><?xml version="1.0" encoding="utf-8"?>
 <p:sld xmlns:a="http://schemas.openxmlformats.org/drawingml/2006/main" xmlns:r="http://schemas.openxmlformats.org/officeDocument/2006/relationships" xmlns:p="http://schemas.openxmlformats.org/presentationml/2006/main" show="0">
   <p:cSld>
     <p:spTree>
@@ -5575,7 +5770,7 @@
             <a:fld id="{D57F1E4F-1CFF-5643-939E-217C01CDF565}" type="slidenum">
               <a:rPr lang="en-US" smtClean="0"/>
               <a:pPr/>
-              <a:t>11</a:t>
+              <a:t>12</a:t>
             </a:fld>
             <a:endParaRPr lang="en-US" dirty="0"/>
           </a:p>
@@ -5606,7 +5801,7 @@
 </p:sld>
 </file>
 
-<file path=ppt/slides/slide12.xml><?xml version="1.0" encoding="utf-8"?>
+<file path=ppt/slides/slide13.xml><?xml version="1.0" encoding="utf-8"?>
 <p:sld xmlns:a="http://schemas.openxmlformats.org/drawingml/2006/main" xmlns:r="http://schemas.openxmlformats.org/officeDocument/2006/relationships" xmlns:p="http://schemas.openxmlformats.org/presentationml/2006/main" show="0">
   <p:cSld>
     <p:spTree>
@@ -5833,7 +6028,7 @@
             <a:fld id="{D57F1E4F-1CFF-5643-939E-217C01CDF565}" type="slidenum">
               <a:rPr lang="en-US" smtClean="0"/>
               <a:pPr/>
-              <a:t>12</a:t>
+              <a:t>13</a:t>
             </a:fld>
             <a:endParaRPr lang="en-US" dirty="0"/>
           </a:p>
@@ -5976,7 +6171,7 @@
 </p:sld>
 </file>
 
-<file path=ppt/slides/slide13.xml><?xml version="1.0" encoding="utf-8"?>
+<file path=ppt/slides/slide14.xml><?xml version="1.0" encoding="utf-8"?>
 <p:sld xmlns:a="http://schemas.openxmlformats.org/drawingml/2006/main" xmlns:r="http://schemas.openxmlformats.org/officeDocument/2006/relationships" xmlns:p="http://schemas.openxmlformats.org/presentationml/2006/main" show="0">
   <p:cSld>
     <p:spTree>
@@ -6139,7 +6334,7 @@
             <a:fld id="{D57F1E4F-1CFF-5643-939E-217C01CDF565}" type="slidenum">
               <a:rPr lang="en-US" smtClean="0"/>
               <a:pPr/>
-              <a:t>13</a:t>
+              <a:t>14</a:t>
             </a:fld>
             <a:endParaRPr lang="en-US" dirty="0"/>
           </a:p>
@@ -6170,7 +6365,7 @@
 </p:sld>
 </file>
 
-<file path=ppt/slides/slide14.xml><?xml version="1.0" encoding="utf-8"?>
+<file path=ppt/slides/slide15.xml><?xml version="1.0" encoding="utf-8"?>
 <p:sld xmlns:a="http://schemas.openxmlformats.org/drawingml/2006/main" xmlns:r="http://schemas.openxmlformats.org/officeDocument/2006/relationships" xmlns:p="http://schemas.openxmlformats.org/presentationml/2006/main" show="0">
   <p:cSld>
     <p:spTree>
@@ -6378,7 +6573,7 @@
             <a:fld id="{D57F1E4F-1CFF-5643-939E-217C01CDF565}" type="slidenum">
               <a:rPr lang="en-US" smtClean="0"/>
               <a:pPr/>
-              <a:t>14</a:t>
+              <a:t>15</a:t>
             </a:fld>
             <a:endParaRPr lang="en-US" dirty="0"/>
           </a:p>
@@ -6439,7 +6634,7 @@
 </p:sld>
 </file>
 
-<file path=ppt/slides/slide15.xml><?xml version="1.0" encoding="utf-8"?>
+<file path=ppt/slides/slide16.xml><?xml version="1.0" encoding="utf-8"?>
 <p:sld xmlns:a="http://schemas.openxmlformats.org/drawingml/2006/main" xmlns:r="http://schemas.openxmlformats.org/officeDocument/2006/relationships" xmlns:p="http://schemas.openxmlformats.org/presentationml/2006/main" show="0">
   <p:cSld>
     <p:spTree>
@@ -6607,7 +6802,7 @@
             <a:fld id="{D57F1E4F-1CFF-5643-939E-217C01CDF565}" type="slidenum">
               <a:rPr lang="en-US" smtClean="0"/>
               <a:pPr/>
-              <a:t>15</a:t>
+              <a:t>16</a:t>
             </a:fld>
             <a:endParaRPr lang="en-US" dirty="0"/>
           </a:p>

</xml_diff>